<commit_message>
Test level and updated level
</commit_message>
<xml_diff>
--- a/GGJ/Documents/Zombie Hamsters.pptx
+++ b/GGJ/Documents/Zombie Hamsters.pptx
@@ -14,9 +14,13 @@
     <p:sldId id="260" r:id="rId8"/>
     <p:sldId id="261" r:id="rId9"/>
     <p:sldId id="266" r:id="rId10"/>
-    <p:sldId id="262" r:id="rId11"/>
-    <p:sldId id="264" r:id="rId12"/>
-    <p:sldId id="265" r:id="rId13"/>
+    <p:sldId id="269" r:id="rId11"/>
+    <p:sldId id="270" r:id="rId12"/>
+    <p:sldId id="271" r:id="rId13"/>
+    <p:sldId id="262" r:id="rId14"/>
+    <p:sldId id="268" r:id="rId15"/>
+    <p:sldId id="264" r:id="rId16"/>
+    <p:sldId id="265" r:id="rId17"/>
   </p:sldIdLst>
   <p:sldSz cx="12192000" cy="6858000"/>
   <p:notesSz cx="6858000" cy="9144000"/>
@@ -115,7 +119,16 @@
       </a:defRPr>
     </a:lvl9pPr>
   </p:defaultTextStyle>
+  <p:extLst>
+    <p:ext uri="{EFAFB233-063F-42B5-8137-9DF3F51BA10A}">
+      <p15:sldGuideLst xmlns:p15="http://schemas.microsoft.com/office/powerpoint/2012/main"/>
+    </p:ext>
+  </p:extLst>
 </p:presentation>
+</file>
+
+<file path=ppt/revisionInfo.xml><?xml version="1.0" encoding="utf-8"?>
+<p1510:revInfo xmlns:a="http://schemas.openxmlformats.org/drawingml/2006/main" xmlns:r="http://schemas.openxmlformats.org/officeDocument/2006/relationships" xmlns:p1510="http://schemas.microsoft.com/office/powerpoint/2015/10/main"/>
 </file>
 
 <file path=ppt/slideLayouts/slideLayout1.xml><?xml version="1.0" encoding="utf-8"?>
@@ -3429,7 +3442,7 @@
           <p:cNvPr id="2" name="Title 1">
             <a:extLst>
               <a:ext uri="{FF2B5EF4-FFF2-40B4-BE49-F238E27FC236}">
-                <a16:creationId xmlns:a16="http://schemas.microsoft.com/office/drawing/2014/main" id="{6D006E7C-907C-44B3-8473-15E526321FF1}"/>
+                <a16:creationId xmlns:a16="http://schemas.microsoft.com/office/drawing/2014/main" id="{F8BC9960-E902-4AC1-B945-5B04A7C68B47}"/>
               </a:ext>
             </a:extLst>
           </p:cNvPr>
@@ -3447,7 +3460,7 @@
           <a:p>
             <a:r>
               <a:rPr lang="en-US" dirty="0"/>
-              <a:t>Level Design</a:t>
+              <a:t>Player experience, how does 1 level work</a:t>
             </a:r>
           </a:p>
         </p:txBody>
@@ -3457,7 +3470,7 @@
           <p:cNvPr id="3" name="Content Placeholder 2">
             <a:extLst>
               <a:ext uri="{FF2B5EF4-FFF2-40B4-BE49-F238E27FC236}">
-                <a16:creationId xmlns:a16="http://schemas.microsoft.com/office/drawing/2014/main" id="{6BFEB578-19C6-480F-8D0E-09310165BCAE}"/>
+                <a16:creationId xmlns:a16="http://schemas.microsoft.com/office/drawing/2014/main" id="{279EDDE6-8DB8-4B41-A877-0874501F8A6D}"/>
               </a:ext>
             </a:extLst>
           </p:cNvPr>
@@ -3470,17 +3483,40 @@
         </p:nvSpPr>
         <p:spPr/>
         <p:txBody>
-          <a:bodyPr/>
-          <a:lstStyle/>
-          <a:p>
-            <a:endParaRPr lang="en-US"/>
+          <a:bodyPr>
+            <a:normAutofit/>
+          </a:bodyPr>
+          <a:lstStyle/>
+          <a:p>
+            <a:r>
+              <a:rPr lang="en-US" dirty="0"/>
+              <a:t>1 tagger, 3 Non-tagger. T will be as quick at the 3 NT’s. He will out smart 1 of the players. The players collide and there will be 2 T and 2 NT.</a:t>
+            </a:r>
+          </a:p>
+          <a:p>
+            <a:r>
+              <a:rPr lang="en-US" dirty="0"/>
+              <a:t>Now the game becomes about team work. 2 T will move 1 host, if working together twice as fast as NT. NT will need to find spots T will not work together. Until NT and T collide and there will be 3 T and 1 NT</a:t>
+            </a:r>
+          </a:p>
+          <a:p>
+            <a:r>
+              <a:rPr lang="en-US" dirty="0"/>
+              <a:t>Now the game is speeding up. 3 T move the host, three times as fast if working together. Player NT will need tot rely on traps and force T in difficult choices.</a:t>
+            </a:r>
+          </a:p>
+          <a:p>
+            <a:pPr marL="0" indent="0">
+              <a:buNone/>
+            </a:pPr>
+            <a:endParaRPr lang="en-US" dirty="0"/>
           </a:p>
         </p:txBody>
       </p:sp>
     </p:spTree>
     <p:extLst>
       <p:ext uri="{BB962C8B-B14F-4D97-AF65-F5344CB8AC3E}">
-        <p14:creationId xmlns:p14="http://schemas.microsoft.com/office/powerpoint/2010/main" val="2458604863"/>
+        <p14:creationId xmlns:p14="http://schemas.microsoft.com/office/powerpoint/2010/main" val="3443627113"/>
       </p:ext>
     </p:extLst>
   </p:cSld>
@@ -3512,7 +3548,7 @@
           <p:cNvPr id="2" name="Title 1">
             <a:extLst>
               <a:ext uri="{FF2B5EF4-FFF2-40B4-BE49-F238E27FC236}">
-                <a16:creationId xmlns:a16="http://schemas.microsoft.com/office/drawing/2014/main" id="{44437ED2-7576-4F01-BBB2-D5DD07912408}"/>
+                <a16:creationId xmlns:a16="http://schemas.microsoft.com/office/drawing/2014/main" id="{60C42FE4-B7BF-455A-B8A6-8E4CFD176E45}"/>
               </a:ext>
             </a:extLst>
           </p:cNvPr>
@@ -3530,7 +3566,7 @@
           <a:p>
             <a:r>
               <a:rPr lang="en-US" dirty="0"/>
-              <a:t>Sounds we need</a:t>
+              <a:t>Win Conditions</a:t>
             </a:r>
           </a:p>
         </p:txBody>
@@ -3540,7 +3576,7 @@
           <p:cNvPr id="3" name="Content Placeholder 2">
             <a:extLst>
               <a:ext uri="{FF2B5EF4-FFF2-40B4-BE49-F238E27FC236}">
-                <a16:creationId xmlns:a16="http://schemas.microsoft.com/office/drawing/2014/main" id="{358A8269-1C4F-4314-A2C3-B6C6A9044A99}"/>
+                <a16:creationId xmlns:a16="http://schemas.microsoft.com/office/drawing/2014/main" id="{968D3F36-1042-489F-B938-AEA6612271F0}"/>
               </a:ext>
             </a:extLst>
           </p:cNvPr>
@@ -3556,14 +3592,23 @@
           <a:bodyPr/>
           <a:lstStyle/>
           <a:p>
-            <a:endParaRPr lang="en-US"/>
+            <a:r>
+              <a:rPr lang="en-US" dirty="0"/>
+              <a:t>Taggers: Tag all players, Once tagged this becomes new winning condition.</a:t>
+            </a:r>
+          </a:p>
+          <a:p>
+            <a:r>
+              <a:rPr lang="en-US" dirty="0"/>
+              <a:t>Non-taggers: Not get tagged until the timer is over.</a:t>
+            </a:r>
           </a:p>
         </p:txBody>
       </p:sp>
     </p:spTree>
     <p:extLst>
       <p:ext uri="{BB962C8B-B14F-4D97-AF65-F5344CB8AC3E}">
-        <p14:creationId xmlns:p14="http://schemas.microsoft.com/office/powerpoint/2010/main" val="696274955"/>
+        <p14:creationId xmlns:p14="http://schemas.microsoft.com/office/powerpoint/2010/main" val="3104032005"/>
       </p:ext>
     </p:extLst>
   </p:cSld>
@@ -3595,7 +3640,7 @@
           <p:cNvPr id="2" name="Title 1">
             <a:extLst>
               <a:ext uri="{FF2B5EF4-FFF2-40B4-BE49-F238E27FC236}">
-                <a16:creationId xmlns:a16="http://schemas.microsoft.com/office/drawing/2014/main" id="{2F7241EB-6E8F-416D-B83F-FFC1360A04B0}"/>
+                <a16:creationId xmlns:a16="http://schemas.microsoft.com/office/drawing/2014/main" id="{8DAA9166-B0BC-4D54-B1C9-4164D79A9F1D}"/>
               </a:ext>
             </a:extLst>
           </p:cNvPr>
@@ -3612,8 +3657,12 @@
           <a:lstStyle/>
           <a:p>
             <a:r>
+              <a:rPr lang="en-US" dirty="0" err="1"/>
+              <a:t>Spawner</a:t>
+            </a:r>
+            <a:r>
               <a:rPr lang="en-US" dirty="0"/>
-              <a:t>UI</a:t>
+              <a:t> </a:t>
             </a:r>
           </a:p>
         </p:txBody>
@@ -3623,7 +3672,7 @@
           <p:cNvPr id="3" name="Content Placeholder 2">
             <a:extLst>
               <a:ext uri="{FF2B5EF4-FFF2-40B4-BE49-F238E27FC236}">
-                <a16:creationId xmlns:a16="http://schemas.microsoft.com/office/drawing/2014/main" id="{B385F851-5B87-4473-B3EF-25B2BD81FF9C}"/>
+                <a16:creationId xmlns:a16="http://schemas.microsoft.com/office/drawing/2014/main" id="{ABBBD182-7297-45C6-8390-53BB4DCC73D3}"/>
               </a:ext>
             </a:extLst>
           </p:cNvPr>
@@ -3639,7 +3688,394 @@
           <a:bodyPr/>
           <a:lstStyle/>
           <a:p>
+            <a:r>
+              <a:rPr lang="en-US" dirty="0"/>
+              <a:t>Spawn Tagger always in same place?</a:t>
+            </a:r>
+          </a:p>
+          <a:p>
+            <a:endParaRPr lang="en-US" dirty="0"/>
+          </a:p>
+        </p:txBody>
+      </p:sp>
+    </p:spTree>
+    <p:extLst>
+      <p:ext uri="{BB962C8B-B14F-4D97-AF65-F5344CB8AC3E}">
+        <p14:creationId xmlns:p14="http://schemas.microsoft.com/office/powerpoint/2010/main" val="3193686593"/>
+      </p:ext>
+    </p:extLst>
+  </p:cSld>
+  <p:clrMapOvr>
+    <a:masterClrMapping/>
+  </p:clrMapOvr>
+</p:sld>
+</file>
+
+<file path=ppt/slides/slide13.xml><?xml version="1.0" encoding="utf-8"?>
+<p:sld xmlns:a="http://schemas.openxmlformats.org/drawingml/2006/main" xmlns:r="http://schemas.openxmlformats.org/officeDocument/2006/relationships" xmlns:p="http://schemas.openxmlformats.org/presentationml/2006/main">
+  <p:cSld>
+    <p:spTree>
+      <p:nvGrpSpPr>
+        <p:cNvPr id="1" name=""/>
+        <p:cNvGrpSpPr/>
+        <p:nvPr/>
+      </p:nvGrpSpPr>
+      <p:grpSpPr>
+        <a:xfrm>
+          <a:off x="0" y="0"/>
+          <a:ext cx="0" cy="0"/>
+          <a:chOff x="0" y="0"/>
+          <a:chExt cx="0" cy="0"/>
+        </a:xfrm>
+      </p:grpSpPr>
+      <p:sp>
+        <p:nvSpPr>
+          <p:cNvPr id="2" name="Title 1">
+            <a:extLst>
+              <a:ext uri="{FF2B5EF4-FFF2-40B4-BE49-F238E27FC236}">
+                <a16:creationId xmlns:a16="http://schemas.microsoft.com/office/drawing/2014/main" id="{6D006E7C-907C-44B3-8473-15E526321FF1}"/>
+              </a:ext>
+            </a:extLst>
+          </p:cNvPr>
+          <p:cNvSpPr>
+            <a:spLocks noGrp="1"/>
+          </p:cNvSpPr>
+          <p:nvPr>
+            <p:ph type="title"/>
+          </p:nvPr>
+        </p:nvSpPr>
+        <p:spPr/>
+        <p:txBody>
+          <a:bodyPr/>
+          <a:lstStyle/>
+          <a:p>
+            <a:r>
+              <a:rPr lang="en-US" dirty="0"/>
+              <a:t>Level Design</a:t>
+            </a:r>
+          </a:p>
+        </p:txBody>
+      </p:sp>
+      <p:sp>
+        <p:nvSpPr>
+          <p:cNvPr id="3" name="Content Placeholder 2">
+            <a:extLst>
+              <a:ext uri="{FF2B5EF4-FFF2-40B4-BE49-F238E27FC236}">
+                <a16:creationId xmlns:a16="http://schemas.microsoft.com/office/drawing/2014/main" id="{6BFEB578-19C6-480F-8D0E-09310165BCAE}"/>
+              </a:ext>
+            </a:extLst>
+          </p:cNvPr>
+          <p:cNvSpPr>
+            <a:spLocks noGrp="1"/>
+          </p:cNvSpPr>
+          <p:nvPr>
+            <p:ph idx="1"/>
+          </p:nvPr>
+        </p:nvSpPr>
+        <p:spPr>
+          <a:xfrm>
+            <a:off x="838201" y="1825625"/>
+            <a:ext cx="2951922" cy="2547592"/>
+          </a:xfrm>
+        </p:spPr>
+        <p:txBody>
+          <a:bodyPr/>
+          <a:lstStyle/>
+          <a:p>
+            <a:r>
+              <a:rPr lang="en-US" dirty="0"/>
+              <a:t>8 main route</a:t>
+            </a:r>
+          </a:p>
+          <a:p>
+            <a:r>
+              <a:rPr lang="en-US" dirty="0"/>
+              <a:t>8 escape route</a:t>
+            </a:r>
+          </a:p>
+          <a:p>
+            <a:r>
+              <a:rPr lang="en-US" dirty="0"/>
+              <a:t>Everything needs to be visible</a:t>
+            </a:r>
+          </a:p>
+          <a:p>
+            <a:r>
+              <a:rPr lang="en-US" dirty="0"/>
+              <a:t>3 Floors </a:t>
+            </a:r>
+          </a:p>
+          <a:p>
+            <a:pPr marL="0" indent="0">
+              <a:buNone/>
+            </a:pPr>
+            <a:endParaRPr lang="en-US" dirty="0"/>
+          </a:p>
+        </p:txBody>
+      </p:sp>
+    </p:spTree>
+    <p:extLst>
+      <p:ext uri="{BB962C8B-B14F-4D97-AF65-F5344CB8AC3E}">
+        <p14:creationId xmlns:p14="http://schemas.microsoft.com/office/powerpoint/2010/main" val="2458604863"/>
+      </p:ext>
+    </p:extLst>
+  </p:cSld>
+  <p:clrMapOvr>
+    <a:masterClrMapping/>
+  </p:clrMapOvr>
+</p:sld>
+</file>
+
+<file path=ppt/slides/slide14.xml><?xml version="1.0" encoding="utf-8"?>
+<p:sld xmlns:a="http://schemas.openxmlformats.org/drawingml/2006/main" xmlns:r="http://schemas.openxmlformats.org/officeDocument/2006/relationships" xmlns:p="http://schemas.openxmlformats.org/presentationml/2006/main">
+  <p:cSld>
+    <p:spTree>
+      <p:nvGrpSpPr>
+        <p:cNvPr id="1" name=""/>
+        <p:cNvGrpSpPr/>
+        <p:nvPr/>
+      </p:nvGrpSpPr>
+      <p:grpSpPr>
+        <a:xfrm>
+          <a:off x="0" y="0"/>
+          <a:ext cx="0" cy="0"/>
+          <a:chOff x="0" y="0"/>
+          <a:chExt cx="0" cy="0"/>
+        </a:xfrm>
+      </p:grpSpPr>
+      <p:sp>
+        <p:nvSpPr>
+          <p:cNvPr id="2" name="Title 1">
+            <a:extLst>
+              <a:ext uri="{FF2B5EF4-FFF2-40B4-BE49-F238E27FC236}">
+                <a16:creationId xmlns:a16="http://schemas.microsoft.com/office/drawing/2014/main" id="{6D006E7C-907C-44B3-8473-15E526321FF1}"/>
+              </a:ext>
+            </a:extLst>
+          </p:cNvPr>
+          <p:cNvSpPr>
+            <a:spLocks noGrp="1"/>
+          </p:cNvSpPr>
+          <p:nvPr>
+            <p:ph type="title"/>
+          </p:nvPr>
+        </p:nvSpPr>
+        <p:spPr/>
+        <p:txBody>
+          <a:bodyPr/>
+          <a:lstStyle/>
+          <a:p>
+            <a:r>
+              <a:rPr lang="en-US" dirty="0"/>
+              <a:t>Level Design</a:t>
+            </a:r>
+          </a:p>
+        </p:txBody>
+      </p:sp>
+      <p:sp>
+        <p:nvSpPr>
+          <p:cNvPr id="3" name="Content Placeholder 2">
+            <a:extLst>
+              <a:ext uri="{FF2B5EF4-FFF2-40B4-BE49-F238E27FC236}">
+                <a16:creationId xmlns:a16="http://schemas.microsoft.com/office/drawing/2014/main" id="{6BFEB578-19C6-480F-8D0E-09310165BCAE}"/>
+              </a:ext>
+            </a:extLst>
+          </p:cNvPr>
+          <p:cNvSpPr>
+            <a:spLocks noGrp="1"/>
+          </p:cNvSpPr>
+          <p:nvPr>
+            <p:ph idx="1"/>
+          </p:nvPr>
+        </p:nvSpPr>
+        <p:spPr>
+          <a:xfrm>
+            <a:off x="838200" y="1825625"/>
+            <a:ext cx="3057939" cy="2547592"/>
+          </a:xfrm>
+        </p:spPr>
+        <p:txBody>
+          <a:bodyPr/>
+          <a:lstStyle/>
+          <a:p>
+            <a:r>
+              <a:rPr lang="en-US" dirty="0"/>
+              <a:t>Top down</a:t>
+            </a:r>
+          </a:p>
+          <a:p>
+            <a:pPr marL="0" indent="0">
+              <a:buNone/>
+            </a:pPr>
+            <a:endParaRPr lang="en-US" dirty="0"/>
+          </a:p>
+        </p:txBody>
+      </p:sp>
+    </p:spTree>
+    <p:extLst>
+      <p:ext uri="{BB962C8B-B14F-4D97-AF65-F5344CB8AC3E}">
+        <p14:creationId xmlns:p14="http://schemas.microsoft.com/office/powerpoint/2010/main" val="1766547879"/>
+      </p:ext>
+    </p:extLst>
+  </p:cSld>
+  <p:clrMapOvr>
+    <a:masterClrMapping/>
+  </p:clrMapOvr>
+</p:sld>
+</file>
+
+<file path=ppt/slides/slide15.xml><?xml version="1.0" encoding="utf-8"?>
+<p:sld xmlns:a="http://schemas.openxmlformats.org/drawingml/2006/main" xmlns:r="http://schemas.openxmlformats.org/officeDocument/2006/relationships" xmlns:p="http://schemas.openxmlformats.org/presentationml/2006/main">
+  <p:cSld>
+    <p:spTree>
+      <p:nvGrpSpPr>
+        <p:cNvPr id="1" name=""/>
+        <p:cNvGrpSpPr/>
+        <p:nvPr/>
+      </p:nvGrpSpPr>
+      <p:grpSpPr>
+        <a:xfrm>
+          <a:off x="0" y="0"/>
+          <a:ext cx="0" cy="0"/>
+          <a:chOff x="0" y="0"/>
+          <a:chExt cx="0" cy="0"/>
+        </a:xfrm>
+      </p:grpSpPr>
+      <p:sp>
+        <p:nvSpPr>
+          <p:cNvPr id="2" name="Title 1">
+            <a:extLst>
+              <a:ext uri="{FF2B5EF4-FFF2-40B4-BE49-F238E27FC236}">
+                <a16:creationId xmlns:a16="http://schemas.microsoft.com/office/drawing/2014/main" id="{44437ED2-7576-4F01-BBB2-D5DD07912408}"/>
+              </a:ext>
+            </a:extLst>
+          </p:cNvPr>
+          <p:cNvSpPr>
+            <a:spLocks noGrp="1"/>
+          </p:cNvSpPr>
+          <p:nvPr>
+            <p:ph type="title"/>
+          </p:nvPr>
+        </p:nvSpPr>
+        <p:spPr/>
+        <p:txBody>
+          <a:bodyPr/>
+          <a:lstStyle/>
+          <a:p>
+            <a:r>
+              <a:rPr lang="en-US" dirty="0"/>
+              <a:t>Sounds we need</a:t>
+            </a:r>
+          </a:p>
+        </p:txBody>
+      </p:sp>
+      <p:sp>
+        <p:nvSpPr>
+          <p:cNvPr id="3" name="Content Placeholder 2">
+            <a:extLst>
+              <a:ext uri="{FF2B5EF4-FFF2-40B4-BE49-F238E27FC236}">
+                <a16:creationId xmlns:a16="http://schemas.microsoft.com/office/drawing/2014/main" id="{358A8269-1C4F-4314-A2C3-B6C6A9044A99}"/>
+              </a:ext>
+            </a:extLst>
+          </p:cNvPr>
+          <p:cNvSpPr>
+            <a:spLocks noGrp="1"/>
+          </p:cNvSpPr>
+          <p:nvPr>
+            <p:ph idx="1"/>
+          </p:nvPr>
+        </p:nvSpPr>
+        <p:spPr/>
+        <p:txBody>
+          <a:bodyPr/>
+          <a:lstStyle/>
+          <a:p>
             <a:endParaRPr lang="en-US"/>
+          </a:p>
+        </p:txBody>
+      </p:sp>
+    </p:spTree>
+    <p:extLst>
+      <p:ext uri="{BB962C8B-B14F-4D97-AF65-F5344CB8AC3E}">
+        <p14:creationId xmlns:p14="http://schemas.microsoft.com/office/powerpoint/2010/main" val="696274955"/>
+      </p:ext>
+    </p:extLst>
+  </p:cSld>
+  <p:clrMapOvr>
+    <a:masterClrMapping/>
+  </p:clrMapOvr>
+</p:sld>
+</file>
+
+<file path=ppt/slides/slide16.xml><?xml version="1.0" encoding="utf-8"?>
+<p:sld xmlns:a="http://schemas.openxmlformats.org/drawingml/2006/main" xmlns:r="http://schemas.openxmlformats.org/officeDocument/2006/relationships" xmlns:p="http://schemas.openxmlformats.org/presentationml/2006/main">
+  <p:cSld>
+    <p:spTree>
+      <p:nvGrpSpPr>
+        <p:cNvPr id="1" name=""/>
+        <p:cNvGrpSpPr/>
+        <p:nvPr/>
+      </p:nvGrpSpPr>
+      <p:grpSpPr>
+        <a:xfrm>
+          <a:off x="0" y="0"/>
+          <a:ext cx="0" cy="0"/>
+          <a:chOff x="0" y="0"/>
+          <a:chExt cx="0" cy="0"/>
+        </a:xfrm>
+      </p:grpSpPr>
+      <p:sp>
+        <p:nvSpPr>
+          <p:cNvPr id="2" name="Title 1">
+            <a:extLst>
+              <a:ext uri="{FF2B5EF4-FFF2-40B4-BE49-F238E27FC236}">
+                <a16:creationId xmlns:a16="http://schemas.microsoft.com/office/drawing/2014/main" id="{2F7241EB-6E8F-416D-B83F-FFC1360A04B0}"/>
+              </a:ext>
+            </a:extLst>
+          </p:cNvPr>
+          <p:cNvSpPr>
+            <a:spLocks noGrp="1"/>
+          </p:cNvSpPr>
+          <p:nvPr>
+            <p:ph type="title"/>
+          </p:nvPr>
+        </p:nvSpPr>
+        <p:spPr/>
+        <p:txBody>
+          <a:bodyPr/>
+          <a:lstStyle/>
+          <a:p>
+            <a:r>
+              <a:rPr lang="en-US" dirty="0"/>
+              <a:t>UI</a:t>
+            </a:r>
+          </a:p>
+        </p:txBody>
+      </p:sp>
+      <p:sp>
+        <p:nvSpPr>
+          <p:cNvPr id="3" name="Content Placeholder 2">
+            <a:extLst>
+              <a:ext uri="{FF2B5EF4-FFF2-40B4-BE49-F238E27FC236}">
+                <a16:creationId xmlns:a16="http://schemas.microsoft.com/office/drawing/2014/main" id="{B385F851-5B87-4473-B3EF-25B2BD81FF9C}"/>
+              </a:ext>
+            </a:extLst>
+          </p:cNvPr>
+          <p:cNvSpPr>
+            <a:spLocks noGrp="1"/>
+          </p:cNvSpPr>
+          <p:nvPr>
+            <p:ph idx="1"/>
+          </p:nvPr>
+        </p:nvSpPr>
+        <p:spPr/>
+        <p:txBody>
+          <a:bodyPr/>
+          <a:lstStyle/>
+          <a:p>
+            <a:r>
+              <a:rPr lang="en-US" dirty="0"/>
+              <a:t>Timer</a:t>
+            </a:r>
           </a:p>
         </p:txBody>
       </p:sp>
@@ -11647,8 +12083,14 @@
           <a:p>
             <a:r>
               <a:rPr lang="en-US" dirty="0"/>
-              <a:t>Two way tubes.</a:t>
-            </a:r>
+              <a:t>Two-way tubes.</a:t>
+            </a:r>
+          </a:p>
+          <a:p>
+            <a:endParaRPr lang="en-US" dirty="0"/>
+          </a:p>
+          <a:p>
+            <a:endParaRPr lang="en-US" dirty="0"/>
           </a:p>
         </p:txBody>
       </p:sp>
@@ -11997,15 +12439,15 @@
         </p:spPr>
         <p:style>
           <a:lnRef idx="2">
-            <a:schemeClr val="accent3">
+            <a:schemeClr val="dk1">
               <a:shade val="50000"/>
             </a:schemeClr>
           </a:lnRef>
           <a:fillRef idx="1">
-            <a:schemeClr val="accent3"/>
+            <a:schemeClr val="dk1"/>
           </a:fillRef>
           <a:effectRef idx="0">
-            <a:schemeClr val="accent3"/>
+            <a:schemeClr val="dk1"/>
           </a:effectRef>
           <a:fontRef idx="minor">
             <a:schemeClr val="lt1"/>
@@ -12043,15 +12485,15 @@
         </p:spPr>
         <p:style>
           <a:lnRef idx="2">
-            <a:schemeClr val="accent3">
+            <a:schemeClr val="dk1">
               <a:shade val="50000"/>
             </a:schemeClr>
           </a:lnRef>
           <a:fillRef idx="1">
-            <a:schemeClr val="accent3"/>
+            <a:schemeClr val="dk1"/>
           </a:fillRef>
           <a:effectRef idx="0">
-            <a:schemeClr val="accent3"/>
+            <a:schemeClr val="dk1"/>
           </a:effectRef>
           <a:fontRef idx="minor">
             <a:schemeClr val="lt1"/>

</xml_diff>